<commit_message>
2017 06 15 test
</commit_message>
<xml_diff>
--- a/src/doc/职级评审_商城技术部-王雷.pptx
+++ b/src/doc/职级评审_商城技术部-王雷.pptx
@@ -17409,6 +17409,249 @@
       <p:grpSpPr/>
       <p:sp>
         <p:nvSpPr>
+          <p:cNvPr id="27" name="矩形 26"/>
+          <p:cNvSpPr/>
+          <p:nvPr/>
+        </p:nvSpPr>
+        <p:spPr>
+          <a:xfrm>
+            <a:off x="2525395" y="2575560"/>
+            <a:ext cx="1609725" cy="872490"/>
+          </a:xfrm>
+          <a:prstGeom prst="rect">
+            <a:avLst/>
+          </a:prstGeom>
+          <a:solidFill>
+            <a:schemeClr val="accent5"/>
+          </a:solidFill>
+          <a:ln>
+            <a:noFill/>
+          </a:ln>
+        </p:spPr>
+        <p:style>
+          <a:lnRef idx="2">
+            <a:schemeClr val="accent1">
+              <a:shade val="50000"/>
+            </a:schemeClr>
+          </a:lnRef>
+          <a:fillRef idx="1">
+            <a:schemeClr val="accent1"/>
+          </a:fillRef>
+          <a:effectRef idx="0">
+            <a:schemeClr val="accent1"/>
+          </a:effectRef>
+          <a:fontRef idx="minor">
+            <a:schemeClr val="lt1"/>
+          </a:fontRef>
+        </p:style>
+        <p:txBody>
+          <a:bodyPr rtlCol="0" anchor="ctr"/>
+          <a:p>
+            <a:pPr algn="ctr" defTabSz="914400"/>
+            <a:endParaRPr kumimoji="0" lang="zh-CN" altLang="en-US" sz="1200" b="0" i="0" u="none" strike="noStrike" kern="0" cap="none" spc="0" normalizeH="0" baseline="0" noProof="0" dirty="0">
+              <a:ln>
+                <a:noFill/>
+              </a:ln>
+              <a:solidFill>
+                <a:sysClr val="windowText" lastClr="000000"/>
+              </a:solidFill>
+              <a:effectLst/>
+              <a:uLnTx/>
+              <a:uFillTx/>
+              <a:latin typeface="仿宋" panose="02010609060101010101" charset="-122"/>
+              <a:ea typeface="仿宋" panose="02010609060101010101" charset="-122"/>
+              <a:cs typeface="+mn-ea"/>
+              <a:sym typeface="+mn-lt"/>
+            </a:endParaRPr>
+          </a:p>
+        </p:txBody>
+      </p:sp>
+      <p:sp>
+        <p:nvSpPr>
+          <p:cNvPr id="21" name="圆角矩形 20"/>
+          <p:cNvSpPr/>
+          <p:nvPr/>
+        </p:nvSpPr>
+        <p:spPr>
+          <a:xfrm>
+            <a:off x="2525395" y="1347470"/>
+            <a:ext cx="1832610" cy="935355"/>
+          </a:xfrm>
+          <a:prstGeom prst="roundRect">
+            <a:avLst/>
+          </a:prstGeom>
+          <a:solidFill>
+            <a:schemeClr val="accent2">
+              <a:lumMod val="40000"/>
+              <a:lumOff val="60000"/>
+            </a:schemeClr>
+          </a:solidFill>
+          <a:ln>
+            <a:noFill/>
+          </a:ln>
+        </p:spPr>
+        <p:style>
+          <a:lnRef idx="2">
+            <a:schemeClr val="accent1">
+              <a:shade val="50000"/>
+            </a:schemeClr>
+          </a:lnRef>
+          <a:fillRef idx="1">
+            <a:schemeClr val="accent1"/>
+          </a:fillRef>
+          <a:effectRef idx="0">
+            <a:schemeClr val="accent1"/>
+          </a:effectRef>
+          <a:fontRef idx="minor">
+            <a:schemeClr val="lt1"/>
+          </a:fontRef>
+        </p:style>
+        <p:txBody>
+          <a:bodyPr rtlCol="0" anchor="ctr"/>
+          <a:p>
+            <a:pPr algn="ctr" defTabSz="914400"/>
+            <a:r>
+              <a:rPr kumimoji="0" lang="en-US" altLang="zh-CN" sz="1800" b="0" i="0" u="none" strike="noStrike" kern="0" cap="none" spc="0" normalizeH="0" baseline="0" noProof="0" dirty="0">
+                <a:ln>
+                  <a:noFill/>
+                </a:ln>
+                <a:solidFill>
+                  <a:sysClr val="windowText" lastClr="000000"/>
+                </a:solidFill>
+                <a:effectLst/>
+                <a:uLnTx/>
+                <a:uFillTx/>
+                <a:cs typeface="+mn-ea"/>
+                <a:sym typeface="+mn-lt"/>
+              </a:rPr>
+              <a:t>               </a:t>
+            </a:r>
+            <a:endParaRPr kumimoji="0" lang="en-US" altLang="zh-CN" sz="1800" b="0" i="0" u="none" strike="noStrike" kern="0" cap="none" spc="0" normalizeH="0" baseline="0" noProof="0" dirty="0">
+              <a:ln>
+                <a:noFill/>
+              </a:ln>
+              <a:solidFill>
+                <a:sysClr val="windowText" lastClr="000000"/>
+              </a:solidFill>
+              <a:effectLst/>
+              <a:uLnTx/>
+              <a:uFillTx/>
+              <a:cs typeface="+mn-ea"/>
+              <a:sym typeface="+mn-lt"/>
+            </a:endParaRPr>
+          </a:p>
+          <a:p>
+            <a:pPr algn="ctr" defTabSz="914400"/>
+            <a:r>
+              <a:rPr kumimoji="0" lang="en-US" altLang="zh-CN" sz="1800" b="0" i="0" u="none" strike="noStrike" kern="0" cap="none" spc="0" normalizeH="0" baseline="0" noProof="0" dirty="0">
+                <a:ln>
+                  <a:noFill/>
+                </a:ln>
+                <a:solidFill>
+                  <a:sysClr val="windowText" lastClr="000000"/>
+                </a:solidFill>
+                <a:effectLst/>
+                <a:uLnTx/>
+                <a:uFillTx/>
+                <a:cs typeface="+mn-ea"/>
+                <a:sym typeface="+mn-lt"/>
+              </a:rPr>
+              <a:t>docker</a:t>
+            </a:r>
+            <a:endParaRPr kumimoji="0" lang="en-US" altLang="zh-CN" sz="1800" b="0" i="0" u="none" strike="noStrike" kern="0" cap="none" spc="0" normalizeH="0" baseline="0" noProof="0" dirty="0">
+              <a:ln>
+                <a:noFill/>
+              </a:ln>
+              <a:solidFill>
+                <a:sysClr val="windowText" lastClr="000000"/>
+              </a:solidFill>
+              <a:effectLst/>
+              <a:uLnTx/>
+              <a:uFillTx/>
+              <a:cs typeface="+mn-ea"/>
+              <a:sym typeface="+mn-lt"/>
+            </a:endParaRPr>
+          </a:p>
+        </p:txBody>
+      </p:sp>
+      <p:sp>
+        <p:nvSpPr>
+          <p:cNvPr id="14" name="圆角矩形 13"/>
+          <p:cNvSpPr/>
+          <p:nvPr/>
+        </p:nvSpPr>
+        <p:spPr>
+          <a:xfrm>
+            <a:off x="57150" y="1259205"/>
+            <a:ext cx="1661795" cy="923290"/>
+          </a:xfrm>
+          <a:prstGeom prst="roundRect">
+            <a:avLst/>
+          </a:prstGeom>
+          <a:solidFill>
+            <a:schemeClr val="accent2">
+              <a:lumMod val="40000"/>
+              <a:lumOff val="60000"/>
+            </a:schemeClr>
+          </a:solidFill>
+          <a:ln>
+            <a:noFill/>
+          </a:ln>
+        </p:spPr>
+        <p:style>
+          <a:lnRef idx="2">
+            <a:schemeClr val="accent1">
+              <a:shade val="50000"/>
+            </a:schemeClr>
+          </a:lnRef>
+          <a:fillRef idx="1">
+            <a:schemeClr val="accent1"/>
+          </a:fillRef>
+          <a:effectRef idx="0">
+            <a:schemeClr val="accent1"/>
+          </a:effectRef>
+          <a:fontRef idx="minor">
+            <a:schemeClr val="lt1"/>
+          </a:fontRef>
+        </p:style>
+        <p:txBody>
+          <a:bodyPr rtlCol="0" anchor="ctr"/>
+          <a:p>
+            <a:pPr algn="ctr" defTabSz="914400"/>
+            <a:r>
+              <a:rPr kumimoji="0" lang="en-US" altLang="zh-CN" sz="1800" b="0" i="0" u="none" strike="noStrike" kern="0" cap="none" spc="0" normalizeH="0" baseline="0" noProof="0" dirty="0">
+                <a:ln>
+                  <a:noFill/>
+                </a:ln>
+                <a:solidFill>
+                  <a:sysClr val="windowText" lastClr="000000"/>
+                </a:solidFill>
+                <a:effectLst/>
+                <a:uLnTx/>
+                <a:uFillTx/>
+                <a:cs typeface="+mn-ea"/>
+                <a:sym typeface="+mn-lt"/>
+              </a:rPr>
+              <a:t>            docker</a:t>
+            </a:r>
+            <a:endParaRPr kumimoji="0" lang="en-US" altLang="zh-CN" sz="1800" b="0" i="0" u="none" strike="noStrike" kern="0" cap="none" spc="0" normalizeH="0" baseline="0" noProof="0" dirty="0">
+              <a:ln>
+                <a:noFill/>
+              </a:ln>
+              <a:solidFill>
+                <a:sysClr val="windowText" lastClr="000000"/>
+              </a:solidFill>
+              <a:effectLst/>
+              <a:uLnTx/>
+              <a:uFillTx/>
+              <a:cs typeface="+mn-ea"/>
+              <a:sym typeface="+mn-lt"/>
+            </a:endParaRPr>
+          </a:p>
+        </p:txBody>
+      </p:sp>
+      <p:sp>
+        <p:nvSpPr>
           <p:cNvPr id="2" name="内容占位符 1"/>
           <p:cNvSpPr>
             <a:spLocks noGrp="1"/>
@@ -17653,8 +17896,8 @@
         </p:nvSpPr>
         <p:spPr>
           <a:xfrm>
-            <a:off x="395605" y="1347470"/>
-            <a:ext cx="935990" cy="575945"/>
+            <a:off x="247015" y="1438910"/>
+            <a:ext cx="617855" cy="336550"/>
           </a:xfrm>
           <a:prstGeom prst="rect">
             <a:avLst/>
@@ -17730,8 +17973,686 @@
         </p:nvSpPr>
         <p:spPr>
           <a:xfrm>
-            <a:off x="2804160" y="1347470"/>
-            <a:ext cx="935990" cy="575945"/>
+            <a:off x="2803525" y="1438910"/>
+            <a:ext cx="610870" cy="427990"/>
+          </a:xfrm>
+          <a:prstGeom prst="rect">
+            <a:avLst/>
+          </a:prstGeom>
+          <a:solidFill>
+            <a:schemeClr val="accent5"/>
+          </a:solidFill>
+          <a:ln>
+            <a:noFill/>
+          </a:ln>
+        </p:spPr>
+        <p:style>
+          <a:lnRef idx="2">
+            <a:schemeClr val="accent1">
+              <a:shade val="50000"/>
+            </a:schemeClr>
+          </a:lnRef>
+          <a:fillRef idx="1">
+            <a:schemeClr val="accent1"/>
+          </a:fillRef>
+          <a:effectRef idx="0">
+            <a:schemeClr val="accent1"/>
+          </a:effectRef>
+          <a:fontRef idx="minor">
+            <a:schemeClr val="lt1"/>
+          </a:fontRef>
+        </p:style>
+        <p:txBody>
+          <a:bodyPr rtlCol="0" anchor="ctr"/>
+          <a:p>
+            <a:pPr algn="ctr" defTabSz="914400"/>
+            <a:r>
+              <a:rPr kumimoji="0" lang="zh-CN" altLang="en-US" sz="1200" b="0" i="0" u="none" strike="noStrike" kern="0" cap="none" spc="0" normalizeH="0" baseline="0" noProof="0" dirty="0">
+                <a:ln>
+                  <a:noFill/>
+                </a:ln>
+                <a:solidFill>
+                  <a:sysClr val="windowText" lastClr="000000"/>
+                </a:solidFill>
+                <a:effectLst/>
+                <a:uLnTx/>
+                <a:uFillTx/>
+                <a:latin typeface="仿宋" panose="02010609060101010101" charset="-122"/>
+                <a:ea typeface="仿宋" panose="02010609060101010101" charset="-122"/>
+                <a:cs typeface="+mn-ea"/>
+                <a:sym typeface="+mn-lt"/>
+              </a:rPr>
+              <a:t>对账系统</a:t>
+            </a:r>
+            <a:endParaRPr kumimoji="0" lang="zh-CN" altLang="en-US" sz="1200" b="0" i="0" u="none" strike="noStrike" kern="0" cap="none" spc="0" normalizeH="0" baseline="0" noProof="0" dirty="0">
+              <a:ln>
+                <a:noFill/>
+              </a:ln>
+              <a:solidFill>
+                <a:sysClr val="windowText" lastClr="000000"/>
+              </a:solidFill>
+              <a:effectLst/>
+              <a:uLnTx/>
+              <a:uFillTx/>
+              <a:latin typeface="仿宋" panose="02010609060101010101" charset="-122"/>
+              <a:ea typeface="仿宋" panose="02010609060101010101" charset="-122"/>
+              <a:cs typeface="+mn-ea"/>
+              <a:sym typeface="+mn-lt"/>
+            </a:endParaRPr>
+          </a:p>
+        </p:txBody>
+      </p:sp>
+      <p:sp>
+        <p:nvSpPr>
+          <p:cNvPr id="8" name="矩形 7"/>
+          <p:cNvSpPr/>
+          <p:nvPr/>
+        </p:nvSpPr>
+        <p:spPr>
+          <a:xfrm>
+            <a:off x="330835" y="2642870"/>
+            <a:ext cx="918210" cy="575310"/>
+          </a:xfrm>
+          <a:prstGeom prst="rect">
+            <a:avLst/>
+          </a:prstGeom>
+          <a:solidFill>
+            <a:schemeClr val="accent5"/>
+          </a:solidFill>
+          <a:ln>
+            <a:noFill/>
+          </a:ln>
+        </p:spPr>
+        <p:style>
+          <a:lnRef idx="2">
+            <a:schemeClr val="accent1">
+              <a:shade val="50000"/>
+            </a:schemeClr>
+          </a:lnRef>
+          <a:fillRef idx="1">
+            <a:schemeClr val="accent1"/>
+          </a:fillRef>
+          <a:effectRef idx="0">
+            <a:schemeClr val="accent1"/>
+          </a:effectRef>
+          <a:fontRef idx="minor">
+            <a:schemeClr val="lt1"/>
+          </a:fontRef>
+        </p:style>
+        <p:txBody>
+          <a:bodyPr rtlCol="0" anchor="ctr"/>
+          <a:p>
+            <a:pPr algn="ctr" defTabSz="914400"/>
+            <a:r>
+              <a:rPr kumimoji="0" lang="zh-CN" altLang="en-US" sz="1200" b="0" i="0" u="none" strike="noStrike" kern="0" cap="none" spc="0" normalizeH="0" baseline="0" noProof="0" dirty="0">
+                <a:ln>
+                  <a:noFill/>
+                </a:ln>
+                <a:solidFill>
+                  <a:sysClr val="windowText" lastClr="000000"/>
+                </a:solidFill>
+                <a:effectLst/>
+                <a:uLnTx/>
+                <a:uFillTx/>
+                <a:latin typeface="仿宋" panose="02010609060101010101" charset="-122"/>
+                <a:ea typeface="仿宋" panose="02010609060101010101" charset="-122"/>
+                <a:cs typeface="+mn-ea"/>
+                <a:sym typeface="+mn-lt"/>
+              </a:rPr>
+              <a:t>分表中间件</a:t>
+            </a:r>
+            <a:endParaRPr kumimoji="0" lang="zh-CN" altLang="en-US" sz="1200" b="0" i="0" u="none" strike="noStrike" kern="0" cap="none" spc="0" normalizeH="0" baseline="0" noProof="0" dirty="0">
+              <a:ln>
+                <a:noFill/>
+              </a:ln>
+              <a:solidFill>
+                <a:sysClr val="windowText" lastClr="000000"/>
+              </a:solidFill>
+              <a:effectLst/>
+              <a:uLnTx/>
+              <a:uFillTx/>
+              <a:latin typeface="仿宋" panose="02010609060101010101" charset="-122"/>
+              <a:ea typeface="仿宋" panose="02010609060101010101" charset="-122"/>
+              <a:cs typeface="+mn-ea"/>
+              <a:sym typeface="+mn-lt"/>
+            </a:endParaRPr>
+          </a:p>
+        </p:txBody>
+      </p:sp>
+      <p:sp>
+        <p:nvSpPr>
+          <p:cNvPr id="10" name="矩形 9"/>
+          <p:cNvSpPr/>
+          <p:nvPr/>
+        </p:nvSpPr>
+        <p:spPr>
+          <a:xfrm>
+            <a:off x="200660" y="3695065"/>
+            <a:ext cx="1518285" cy="815340"/>
+          </a:xfrm>
+          <a:prstGeom prst="rect">
+            <a:avLst/>
+          </a:prstGeom>
+          <a:solidFill>
+            <a:schemeClr val="accent5"/>
+          </a:solidFill>
+          <a:ln>
+            <a:noFill/>
+          </a:ln>
+        </p:spPr>
+        <p:style>
+          <a:lnRef idx="2">
+            <a:schemeClr val="accent1">
+              <a:shade val="50000"/>
+            </a:schemeClr>
+          </a:lnRef>
+          <a:fillRef idx="1">
+            <a:schemeClr val="accent1"/>
+          </a:fillRef>
+          <a:effectRef idx="0">
+            <a:schemeClr val="accent1"/>
+          </a:effectRef>
+          <a:fontRef idx="minor">
+            <a:schemeClr val="lt1"/>
+          </a:fontRef>
+        </p:style>
+        <p:txBody>
+          <a:bodyPr rtlCol="0" anchor="ctr"/>
+          <a:p>
+            <a:pPr algn="ctr" defTabSz="914400"/>
+            <a:endParaRPr kumimoji="0" lang="zh-CN" altLang="en-US" sz="1200" b="0" i="0" u="none" strike="noStrike" kern="0" cap="none" spc="0" normalizeH="0" baseline="0" noProof="0" dirty="0">
+              <a:ln>
+                <a:noFill/>
+              </a:ln>
+              <a:solidFill>
+                <a:sysClr val="windowText" lastClr="000000"/>
+              </a:solidFill>
+              <a:effectLst/>
+              <a:uLnTx/>
+              <a:uFillTx/>
+              <a:latin typeface="仿宋" panose="02010609060101010101" charset="-122"/>
+              <a:ea typeface="仿宋" panose="02010609060101010101" charset="-122"/>
+              <a:cs typeface="+mn-ea"/>
+              <a:sym typeface="+mn-lt"/>
+            </a:endParaRPr>
+          </a:p>
+        </p:txBody>
+      </p:sp>
+      <p:cxnSp>
+        <p:nvCxnSpPr>
+          <p:cNvPr id="12" name="直接箭头连接符 11"/>
+          <p:cNvCxnSpPr/>
+          <p:nvPr/>
+        </p:nvCxnSpPr>
+        <p:spPr>
+          <a:xfrm flipH="1">
+            <a:off x="3262630" y="1993265"/>
+            <a:ext cx="18415" cy="575945"/>
+          </a:xfrm>
+          <a:prstGeom prst="straightConnector1">
+            <a:avLst/>
+          </a:prstGeom>
+          <a:ln>
+            <a:tailEnd type="arrow"/>
+          </a:ln>
+        </p:spPr>
+        <p:style>
+          <a:lnRef idx="1">
+            <a:schemeClr val="accent1"/>
+          </a:lnRef>
+          <a:fillRef idx="0">
+            <a:schemeClr val="accent1"/>
+          </a:fillRef>
+          <a:effectRef idx="0">
+            <a:schemeClr val="accent1"/>
+          </a:effectRef>
+          <a:fontRef idx="minor">
+            <a:schemeClr val="tx1"/>
+          </a:fontRef>
+        </p:style>
+      </p:cxnSp>
+      <p:sp>
+        <p:nvSpPr>
+          <p:cNvPr id="18" name="流程图: 磁盘 17"/>
+          <p:cNvSpPr/>
+          <p:nvPr/>
+        </p:nvSpPr>
+        <p:spPr>
+          <a:xfrm>
+            <a:off x="417830" y="3867785"/>
+            <a:ext cx="447040" cy="470535"/>
+          </a:xfrm>
+          <a:prstGeom prst="flowChartMagneticDisk">
+            <a:avLst/>
+          </a:prstGeom>
+          <a:solidFill>
+            <a:schemeClr val="accent2">
+              <a:lumMod val="40000"/>
+              <a:lumOff val="60000"/>
+            </a:schemeClr>
+          </a:solidFill>
+          <a:ln>
+            <a:noFill/>
+          </a:ln>
+        </p:spPr>
+        <p:style>
+          <a:lnRef idx="2">
+            <a:schemeClr val="accent1">
+              <a:shade val="50000"/>
+            </a:schemeClr>
+          </a:lnRef>
+          <a:fillRef idx="1">
+            <a:schemeClr val="accent1"/>
+          </a:fillRef>
+          <a:effectRef idx="0">
+            <a:schemeClr val="accent1"/>
+          </a:effectRef>
+          <a:fontRef idx="minor">
+            <a:schemeClr val="lt1"/>
+          </a:fontRef>
+        </p:style>
+        <p:txBody>
+          <a:bodyPr rtlCol="0" anchor="ctr"/>
+          <a:p>
+            <a:pPr algn="ctr" defTabSz="914400"/>
+            <a:r>
+              <a:rPr kumimoji="0" lang="en-US" altLang="zh-CN" sz="1000" b="0" i="0" u="none" strike="noStrike" kern="0" cap="none" spc="0" normalizeH="0" baseline="0" noProof="0" dirty="0">
+                <a:ln>
+                  <a:noFill/>
+                </a:ln>
+                <a:solidFill>
+                  <a:sysClr val="windowText" lastClr="000000"/>
+                </a:solidFill>
+                <a:effectLst/>
+                <a:uLnTx/>
+                <a:uFillTx/>
+                <a:latin typeface="仿宋" panose="02010609060101010101" charset="-122"/>
+                <a:ea typeface="仿宋" panose="02010609060101010101" charset="-122"/>
+                <a:cs typeface="+mn-ea"/>
+                <a:sym typeface="+mn-lt"/>
+              </a:rPr>
+              <a:t>mysql</a:t>
+            </a:r>
+            <a:endParaRPr kumimoji="0" lang="en-US" altLang="zh-CN" sz="1000" b="0" i="0" u="none" strike="noStrike" kern="0" cap="none" spc="0" normalizeH="0" baseline="0" noProof="0" dirty="0">
+              <a:ln>
+                <a:noFill/>
+              </a:ln>
+              <a:solidFill>
+                <a:sysClr val="windowText" lastClr="000000"/>
+              </a:solidFill>
+              <a:effectLst/>
+              <a:uLnTx/>
+              <a:uFillTx/>
+              <a:latin typeface="仿宋" panose="02010609060101010101" charset="-122"/>
+              <a:ea typeface="仿宋" panose="02010609060101010101" charset="-122"/>
+              <a:cs typeface="+mn-ea"/>
+              <a:sym typeface="+mn-lt"/>
+            </a:endParaRPr>
+          </a:p>
+        </p:txBody>
+      </p:sp>
+      <p:sp>
+        <p:nvSpPr>
+          <p:cNvPr id="20" name="流程图: 磁盘 19"/>
+          <p:cNvSpPr/>
+          <p:nvPr/>
+        </p:nvSpPr>
+        <p:spPr>
+          <a:xfrm>
+            <a:off x="1184275" y="3867785"/>
+            <a:ext cx="447040" cy="470535"/>
+          </a:xfrm>
+          <a:prstGeom prst="flowChartMagneticDisk">
+            <a:avLst/>
+          </a:prstGeom>
+          <a:solidFill>
+            <a:schemeClr val="accent2">
+              <a:lumMod val="40000"/>
+              <a:lumOff val="60000"/>
+            </a:schemeClr>
+          </a:solidFill>
+          <a:ln>
+            <a:noFill/>
+          </a:ln>
+        </p:spPr>
+        <p:style>
+          <a:lnRef idx="2">
+            <a:schemeClr val="accent1">
+              <a:shade val="50000"/>
+            </a:schemeClr>
+          </a:lnRef>
+          <a:fillRef idx="1">
+            <a:schemeClr val="accent1"/>
+          </a:fillRef>
+          <a:effectRef idx="0">
+            <a:schemeClr val="accent1"/>
+          </a:effectRef>
+          <a:fontRef idx="minor">
+            <a:schemeClr val="lt1"/>
+          </a:fontRef>
+        </p:style>
+        <p:txBody>
+          <a:bodyPr rtlCol="0" anchor="ctr"/>
+          <a:p>
+            <a:pPr algn="ctr" defTabSz="914400"/>
+            <a:r>
+              <a:rPr kumimoji="0" lang="en-US" altLang="zh-CN" sz="1000" b="0" i="0" u="none" strike="noStrike" kern="0" cap="none" spc="0" normalizeH="0" baseline="0" noProof="0" dirty="0">
+                <a:ln>
+                  <a:noFill/>
+                </a:ln>
+                <a:solidFill>
+                  <a:sysClr val="windowText" lastClr="000000"/>
+                </a:solidFill>
+                <a:effectLst/>
+                <a:uLnTx/>
+                <a:uFillTx/>
+                <a:latin typeface="仿宋" panose="02010609060101010101" charset="-122"/>
+                <a:ea typeface="仿宋" panose="02010609060101010101" charset="-122"/>
+                <a:cs typeface="+mn-ea"/>
+                <a:sym typeface="+mn-lt"/>
+              </a:rPr>
+              <a:t>mysql</a:t>
+            </a:r>
+            <a:endParaRPr kumimoji="0" lang="en-US" altLang="zh-CN" sz="1000" b="0" i="0" u="none" strike="noStrike" kern="0" cap="none" spc="0" normalizeH="0" baseline="0" noProof="0" dirty="0">
+              <a:ln>
+                <a:noFill/>
+              </a:ln>
+              <a:solidFill>
+                <a:sysClr val="windowText" lastClr="000000"/>
+              </a:solidFill>
+              <a:effectLst/>
+              <a:uLnTx/>
+              <a:uFillTx/>
+              <a:latin typeface="仿宋" panose="02010609060101010101" charset="-122"/>
+              <a:ea typeface="仿宋" panose="02010609060101010101" charset="-122"/>
+              <a:cs typeface="+mn-ea"/>
+              <a:sym typeface="+mn-lt"/>
+            </a:endParaRPr>
+          </a:p>
+        </p:txBody>
+      </p:sp>
+      <p:sp>
+        <p:nvSpPr>
+          <p:cNvPr id="25" name="流程图: 磁盘 24"/>
+          <p:cNvSpPr/>
+          <p:nvPr/>
+        </p:nvSpPr>
+        <p:spPr>
+          <a:xfrm>
+            <a:off x="3415030" y="2748280"/>
+            <a:ext cx="447040" cy="470535"/>
+          </a:xfrm>
+          <a:prstGeom prst="flowChartMagneticDisk">
+            <a:avLst/>
+          </a:prstGeom>
+          <a:solidFill>
+            <a:schemeClr val="accent2">
+              <a:lumMod val="40000"/>
+              <a:lumOff val="60000"/>
+            </a:schemeClr>
+          </a:solidFill>
+          <a:ln>
+            <a:noFill/>
+          </a:ln>
+        </p:spPr>
+        <p:style>
+          <a:lnRef idx="2">
+            <a:schemeClr val="accent1">
+              <a:shade val="50000"/>
+            </a:schemeClr>
+          </a:lnRef>
+          <a:fillRef idx="1">
+            <a:schemeClr val="accent1"/>
+          </a:fillRef>
+          <a:effectRef idx="0">
+            <a:schemeClr val="accent1"/>
+          </a:effectRef>
+          <a:fontRef idx="minor">
+            <a:schemeClr val="lt1"/>
+          </a:fontRef>
+        </p:style>
+        <p:txBody>
+          <a:bodyPr rtlCol="0" anchor="ctr"/>
+          <a:p>
+            <a:pPr algn="ctr" defTabSz="914400"/>
+            <a:r>
+              <a:rPr kumimoji="0" lang="en-US" altLang="zh-CN" sz="1000" b="0" i="0" u="none" strike="noStrike" kern="0" cap="none" spc="0" normalizeH="0" baseline="0" noProof="0" dirty="0">
+                <a:ln>
+                  <a:noFill/>
+                </a:ln>
+                <a:solidFill>
+                  <a:sysClr val="windowText" lastClr="000000"/>
+                </a:solidFill>
+                <a:effectLst/>
+                <a:uLnTx/>
+                <a:uFillTx/>
+                <a:latin typeface="仿宋" panose="02010609060101010101" charset="-122"/>
+                <a:ea typeface="仿宋" panose="02010609060101010101" charset="-122"/>
+                <a:cs typeface="+mn-ea"/>
+                <a:sym typeface="+mn-lt"/>
+              </a:rPr>
+              <a:t>node</a:t>
+            </a:r>
+            <a:endParaRPr kumimoji="0" lang="en-US" altLang="zh-CN" sz="1000" b="0" i="0" u="none" strike="noStrike" kern="0" cap="none" spc="0" normalizeH="0" baseline="0" noProof="0" dirty="0">
+              <a:ln>
+                <a:noFill/>
+              </a:ln>
+              <a:solidFill>
+                <a:sysClr val="windowText" lastClr="000000"/>
+              </a:solidFill>
+              <a:effectLst/>
+              <a:uLnTx/>
+              <a:uFillTx/>
+              <a:latin typeface="仿宋" panose="02010609060101010101" charset="-122"/>
+              <a:ea typeface="仿宋" panose="02010609060101010101" charset="-122"/>
+              <a:cs typeface="+mn-ea"/>
+              <a:sym typeface="+mn-lt"/>
+            </a:endParaRPr>
+          </a:p>
+        </p:txBody>
+      </p:sp>
+      <p:sp>
+        <p:nvSpPr>
+          <p:cNvPr id="26" name="流程图: 磁盘 25"/>
+          <p:cNvSpPr/>
+          <p:nvPr/>
+        </p:nvSpPr>
+        <p:spPr>
+          <a:xfrm>
+            <a:off x="2815590" y="2747645"/>
+            <a:ext cx="447040" cy="470535"/>
+          </a:xfrm>
+          <a:prstGeom prst="flowChartMagneticDisk">
+            <a:avLst/>
+          </a:prstGeom>
+          <a:solidFill>
+            <a:schemeClr val="accent2">
+              <a:lumMod val="40000"/>
+              <a:lumOff val="60000"/>
+            </a:schemeClr>
+          </a:solidFill>
+          <a:ln>
+            <a:noFill/>
+          </a:ln>
+        </p:spPr>
+        <p:style>
+          <a:lnRef idx="2">
+            <a:schemeClr val="accent1">
+              <a:shade val="50000"/>
+            </a:schemeClr>
+          </a:lnRef>
+          <a:fillRef idx="1">
+            <a:schemeClr val="accent1"/>
+          </a:fillRef>
+          <a:effectRef idx="0">
+            <a:schemeClr val="accent1"/>
+          </a:effectRef>
+          <a:fontRef idx="minor">
+            <a:schemeClr val="lt1"/>
+          </a:fontRef>
+        </p:style>
+        <p:txBody>
+          <a:bodyPr rtlCol="0" anchor="ctr"/>
+          <a:p>
+            <a:pPr algn="ctr" defTabSz="914400"/>
+            <a:r>
+              <a:rPr kumimoji="0" lang="en-US" altLang="zh-CN" sz="1000" b="0" i="0" u="none" strike="noStrike" kern="0" cap="none" spc="0" normalizeH="0" baseline="0" noProof="0" dirty="0">
+                <a:ln>
+                  <a:noFill/>
+                </a:ln>
+                <a:solidFill>
+                  <a:sysClr val="windowText" lastClr="000000"/>
+                </a:solidFill>
+                <a:effectLst/>
+                <a:uLnTx/>
+                <a:uFillTx/>
+                <a:latin typeface="仿宋" panose="02010609060101010101" charset="-122"/>
+                <a:ea typeface="仿宋" panose="02010609060101010101" charset="-122"/>
+                <a:cs typeface="+mn-ea"/>
+                <a:sym typeface="+mn-lt"/>
+              </a:rPr>
+              <a:t>node</a:t>
+            </a:r>
+            <a:endParaRPr kumimoji="0" lang="en-US" altLang="zh-CN" sz="1000" b="0" i="0" u="none" strike="noStrike" kern="0" cap="none" spc="0" normalizeH="0" baseline="0" noProof="0" dirty="0">
+              <a:ln>
+                <a:noFill/>
+              </a:ln>
+              <a:solidFill>
+                <a:sysClr val="windowText" lastClr="000000"/>
+              </a:solidFill>
+              <a:effectLst/>
+              <a:uLnTx/>
+              <a:uFillTx/>
+              <a:latin typeface="仿宋" panose="02010609060101010101" charset="-122"/>
+              <a:ea typeface="仿宋" panose="02010609060101010101" charset="-122"/>
+              <a:cs typeface="+mn-ea"/>
+              <a:sym typeface="+mn-lt"/>
+            </a:endParaRPr>
+          </a:p>
+        </p:txBody>
+      </p:sp>
+      <p:cxnSp>
+        <p:nvCxnSpPr>
+          <p:cNvPr id="29" name="直接箭头连接符 28"/>
+          <p:cNvCxnSpPr>
+            <a:endCxn id="8" idx="0"/>
+          </p:cNvCxnSpPr>
+          <p:nvPr/>
+        </p:nvCxnSpPr>
+        <p:spPr>
+          <a:xfrm>
+            <a:off x="788670" y="2182495"/>
+            <a:ext cx="1270" cy="460375"/>
+          </a:xfrm>
+          <a:prstGeom prst="straightConnector1">
+            <a:avLst/>
+          </a:prstGeom>
+          <a:ln>
+            <a:tailEnd type="arrow"/>
+          </a:ln>
+        </p:spPr>
+        <p:style>
+          <a:lnRef idx="1">
+            <a:schemeClr val="accent1"/>
+          </a:lnRef>
+          <a:fillRef idx="0">
+            <a:schemeClr val="accent1"/>
+          </a:fillRef>
+          <a:effectRef idx="0">
+            <a:schemeClr val="accent1"/>
+          </a:effectRef>
+          <a:fontRef idx="minor">
+            <a:schemeClr val="tx1"/>
+          </a:fontRef>
+        </p:style>
+      </p:cxnSp>
+      <p:sp>
+        <p:nvSpPr>
+          <p:cNvPr id="31" name="矩形 30"/>
+          <p:cNvSpPr/>
+          <p:nvPr/>
+        </p:nvSpPr>
+        <p:spPr>
+          <a:xfrm>
+            <a:off x="1002030" y="1459230"/>
+            <a:ext cx="560705" cy="316230"/>
+          </a:xfrm>
+          <a:prstGeom prst="rect">
+            <a:avLst/>
+          </a:prstGeom>
+          <a:solidFill>
+            <a:schemeClr val="accent5"/>
+          </a:solidFill>
+          <a:ln>
+            <a:noFill/>
+          </a:ln>
+        </p:spPr>
+        <p:style>
+          <a:lnRef idx="2">
+            <a:schemeClr val="accent1">
+              <a:shade val="50000"/>
+            </a:schemeClr>
+          </a:lnRef>
+          <a:fillRef idx="1">
+            <a:schemeClr val="accent1"/>
+          </a:fillRef>
+          <a:effectRef idx="0">
+            <a:schemeClr val="accent1"/>
+          </a:effectRef>
+          <a:fontRef idx="minor">
+            <a:schemeClr val="lt1"/>
+          </a:fontRef>
+        </p:style>
+        <p:txBody>
+          <a:bodyPr rtlCol="0" anchor="ctr"/>
+          <a:p>
+            <a:pPr algn="ctr" defTabSz="914400"/>
+            <a:r>
+              <a:rPr kumimoji="0" lang="zh-CN" altLang="en-US" sz="1200" b="0" i="0" u="none" strike="noStrike" kern="0" cap="none" spc="0" normalizeH="0" baseline="0" noProof="0" dirty="0">
+                <a:ln>
+                  <a:noFill/>
+                </a:ln>
+                <a:solidFill>
+                  <a:sysClr val="windowText" lastClr="000000"/>
+                </a:solidFill>
+                <a:effectLst/>
+                <a:uLnTx/>
+                <a:uFillTx/>
+                <a:latin typeface="仿宋" panose="02010609060101010101" charset="-122"/>
+                <a:ea typeface="仿宋" panose="02010609060101010101" charset="-122"/>
+                <a:cs typeface="+mn-ea"/>
+                <a:sym typeface="+mn-lt"/>
+              </a:rPr>
+              <a:t>对账系统</a:t>
+            </a:r>
+            <a:endParaRPr kumimoji="0" lang="zh-CN" altLang="en-US" sz="1200" b="0" i="0" u="none" strike="noStrike" kern="0" cap="none" spc="0" normalizeH="0" baseline="0" noProof="0" dirty="0">
+              <a:ln>
+                <a:noFill/>
+              </a:ln>
+              <a:solidFill>
+                <a:sysClr val="windowText" lastClr="000000"/>
+              </a:solidFill>
+              <a:effectLst/>
+              <a:uLnTx/>
+              <a:uFillTx/>
+              <a:latin typeface="仿宋" panose="02010609060101010101" charset="-122"/>
+              <a:ea typeface="仿宋" panose="02010609060101010101" charset="-122"/>
+              <a:cs typeface="+mn-ea"/>
+              <a:sym typeface="+mn-lt"/>
+            </a:endParaRPr>
+          </a:p>
+        </p:txBody>
+      </p:sp>
+      <p:sp>
+        <p:nvSpPr>
+          <p:cNvPr id="33" name="矩形 32"/>
+          <p:cNvSpPr/>
+          <p:nvPr/>
+        </p:nvSpPr>
+        <p:spPr>
+          <a:xfrm>
+            <a:off x="3554730" y="1428115"/>
+            <a:ext cx="580390" cy="450215"/>
           </a:xfrm>
           <a:prstGeom prst="rect">
             <a:avLst/>
@@ -17801,17 +18722,14 @@
       </p:sp>
       <p:cxnSp>
         <p:nvCxnSpPr>
-          <p:cNvPr id="6" name="直接箭头连接符 5"/>
-          <p:cNvCxnSpPr>
-            <a:stCxn id="4" idx="2"/>
-            <a:endCxn id="8" idx="0"/>
-          </p:cNvCxnSpPr>
+          <p:cNvPr id="34" name="直接箭头连接符 33"/>
+          <p:cNvCxnSpPr/>
           <p:nvPr/>
         </p:nvCxnSpPr>
         <p:spPr>
-          <a:xfrm flipH="1">
-            <a:off x="845185" y="1923415"/>
-            <a:ext cx="18415" cy="575945"/>
+          <a:xfrm>
+            <a:off x="789940" y="3234690"/>
+            <a:ext cx="1270" cy="460375"/>
           </a:xfrm>
           <a:prstGeom prst="straightConnector1">
             <a:avLst/>
@@ -17837,337 +18755,88 @@
       </p:cxnSp>
       <p:sp>
         <p:nvSpPr>
-          <p:cNvPr id="8" name="矩形 7"/>
-          <p:cNvSpPr/>
+          <p:cNvPr id="35" name="文本框 34"/>
+          <p:cNvSpPr txBox="1"/>
           <p:nvPr/>
         </p:nvSpPr>
         <p:spPr>
           <a:xfrm>
-            <a:off x="377190" y="2499360"/>
-            <a:ext cx="935990" cy="575945"/>
+            <a:off x="3295015" y="3274060"/>
+            <a:ext cx="699770" cy="275590"/>
           </a:xfrm>
           <a:prstGeom prst="rect">
             <a:avLst/>
           </a:prstGeom>
-          <a:solidFill>
-            <a:schemeClr val="accent5"/>
-          </a:solidFill>
-          <a:ln>
-            <a:noFill/>
-          </a:ln>
+          <a:noFill/>
         </p:spPr>
-        <p:style>
-          <a:lnRef idx="2">
-            <a:schemeClr val="accent1">
-              <a:shade val="50000"/>
-            </a:schemeClr>
-          </a:lnRef>
-          <a:fillRef idx="1">
-            <a:schemeClr val="accent1"/>
-          </a:fillRef>
-          <a:effectRef idx="0">
-            <a:schemeClr val="accent1"/>
-          </a:effectRef>
-          <a:fontRef idx="minor">
-            <a:schemeClr val="lt1"/>
-          </a:fontRef>
-        </p:style>
         <p:txBody>
-          <a:bodyPr rtlCol="0" anchor="ctr"/>
+          <a:bodyPr wrap="square" rtlCol="0">
+            <a:spAutoFit/>
+          </a:bodyPr>
           <a:p>
-            <a:pPr algn="ctr" defTabSz="914400"/>
             <a:r>
-              <a:rPr kumimoji="0" lang="zh-CN" altLang="en-US" sz="1200" b="0" i="0" u="none" strike="noStrike" kern="0" cap="none" spc="0" normalizeH="0" baseline="0" noProof="0" dirty="0">
-                <a:ln>
-                  <a:noFill/>
-                </a:ln>
-                <a:solidFill>
-                  <a:sysClr val="windowText" lastClr="000000"/>
-                </a:solidFill>
-                <a:effectLst/>
-                <a:uLnTx/>
-                <a:uFillTx/>
+              <a:rPr lang="en-US" altLang="zh-CN" sz="1200">
                 <a:latin typeface="仿宋" panose="02010609060101010101" charset="-122"/>
                 <a:ea typeface="仿宋" panose="02010609060101010101" charset="-122"/>
-                <a:cs typeface="+mn-ea"/>
-                <a:sym typeface="+mn-lt"/>
               </a:rPr>
-              <a:t>分表中间件</a:t>
+              <a:t>ES</a:t>
             </a:r>
-            <a:endParaRPr kumimoji="0" lang="zh-CN" altLang="en-US" sz="1200" b="0" i="0" u="none" strike="noStrike" kern="0" cap="none" spc="0" normalizeH="0" baseline="0" noProof="0" dirty="0">
-              <a:ln>
-                <a:noFill/>
-              </a:ln>
-              <a:solidFill>
-                <a:sysClr val="windowText" lastClr="000000"/>
-              </a:solidFill>
-              <a:effectLst/>
-              <a:uLnTx/>
-              <a:uFillTx/>
+            <a:r>
+              <a:rPr lang="zh-CN" altLang="en-US" sz="1200">
+                <a:latin typeface="仿宋" panose="02010609060101010101" charset="-122"/>
+                <a:ea typeface="仿宋" panose="02010609060101010101" charset="-122"/>
+              </a:rPr>
+              <a:t>集群</a:t>
+            </a:r>
+            <a:endParaRPr lang="zh-CN" altLang="en-US" sz="1200">
               <a:latin typeface="仿宋" panose="02010609060101010101" charset="-122"/>
               <a:ea typeface="仿宋" panose="02010609060101010101" charset="-122"/>
-              <a:cs typeface="+mn-ea"/>
-              <a:sym typeface="+mn-lt"/>
             </a:endParaRPr>
           </a:p>
         </p:txBody>
       </p:sp>
       <p:sp>
         <p:nvSpPr>
-          <p:cNvPr id="9" name="矩形 8"/>
-          <p:cNvSpPr/>
+          <p:cNvPr id="36" name="文本框 35"/>
+          <p:cNvSpPr txBox="1"/>
           <p:nvPr/>
         </p:nvSpPr>
         <p:spPr>
           <a:xfrm>
-            <a:off x="2804160" y="2637790"/>
-            <a:ext cx="935990" cy="575945"/>
+            <a:off x="754380" y="4382770"/>
+            <a:ext cx="965200" cy="275590"/>
           </a:xfrm>
           <a:prstGeom prst="rect">
             <a:avLst/>
           </a:prstGeom>
-          <a:solidFill>
-            <a:schemeClr val="accent5"/>
-          </a:solidFill>
-          <a:ln>
-            <a:noFill/>
-          </a:ln>
+          <a:noFill/>
         </p:spPr>
-        <p:style>
-          <a:lnRef idx="2">
-            <a:schemeClr val="accent1">
-              <a:shade val="50000"/>
-            </a:schemeClr>
-          </a:lnRef>
-          <a:fillRef idx="1">
-            <a:schemeClr val="accent1"/>
-          </a:fillRef>
-          <a:effectRef idx="0">
-            <a:schemeClr val="accent1"/>
-          </a:effectRef>
-          <a:fontRef idx="minor">
-            <a:schemeClr val="lt1"/>
-          </a:fontRef>
-        </p:style>
         <p:txBody>
-          <a:bodyPr rtlCol="0" anchor="ctr"/>
+          <a:bodyPr wrap="square" rtlCol="0">
+            <a:spAutoFit/>
+          </a:bodyPr>
           <a:p>
-            <a:pPr algn="ctr" defTabSz="914400"/>
             <a:r>
-              <a:rPr kumimoji="0" lang="en-US" altLang="zh-CN" sz="1200" b="0" i="0" u="none" strike="noStrike" kern="0" cap="none" spc="0" normalizeH="0" baseline="0" noProof="0" dirty="0">
-                <a:ln>
-                  <a:noFill/>
-                </a:ln>
-                <a:solidFill>
-                  <a:sysClr val="windowText" lastClr="000000"/>
-                </a:solidFill>
-                <a:effectLst/>
-                <a:uLnTx/>
-                <a:uFillTx/>
+              <a:rPr lang="en-US" altLang="zh-CN" sz="1200">
                 <a:latin typeface="仿宋" panose="02010609060101010101" charset="-122"/>
                 <a:ea typeface="仿宋" panose="02010609060101010101" charset="-122"/>
-                <a:cs typeface="+mn-ea"/>
-                <a:sym typeface="+mn-lt"/>
               </a:rPr>
-              <a:t>ES</a:t>
+              <a:t>mysql </a:t>
             </a:r>
             <a:r>
-              <a:rPr kumimoji="0" lang="zh-CN" altLang="en-US" sz="1200" b="0" i="0" u="none" strike="noStrike" kern="0" cap="none" spc="0" normalizeH="0" baseline="0" noProof="0" dirty="0">
-                <a:ln>
-                  <a:noFill/>
-                </a:ln>
-                <a:solidFill>
-                  <a:sysClr val="windowText" lastClr="000000"/>
-                </a:solidFill>
-                <a:effectLst/>
-                <a:uLnTx/>
-                <a:uFillTx/>
+              <a:rPr lang="zh-CN" altLang="en-US" sz="1200">
                 <a:latin typeface="仿宋" panose="02010609060101010101" charset="-122"/>
                 <a:ea typeface="仿宋" panose="02010609060101010101" charset="-122"/>
-                <a:cs typeface="+mn-ea"/>
-                <a:sym typeface="+mn-lt"/>
               </a:rPr>
               <a:t>集群</a:t>
             </a:r>
-            <a:endParaRPr kumimoji="0" lang="zh-CN" altLang="en-US" sz="1200" b="0" i="0" u="none" strike="noStrike" kern="0" cap="none" spc="0" normalizeH="0" baseline="0" noProof="0" dirty="0">
-              <a:ln>
-                <a:noFill/>
-              </a:ln>
-              <a:solidFill>
-                <a:sysClr val="windowText" lastClr="000000"/>
-              </a:solidFill>
-              <a:effectLst/>
-              <a:uLnTx/>
-              <a:uFillTx/>
+            <a:endParaRPr lang="zh-CN" altLang="en-US" sz="1200">
               <a:latin typeface="仿宋" panose="02010609060101010101" charset="-122"/>
               <a:ea typeface="仿宋" panose="02010609060101010101" charset="-122"/>
-              <a:cs typeface="+mn-ea"/>
-              <a:sym typeface="+mn-lt"/>
             </a:endParaRPr>
           </a:p>
         </p:txBody>
       </p:sp>
-      <p:sp>
-        <p:nvSpPr>
-          <p:cNvPr id="10" name="矩形 9"/>
-          <p:cNvSpPr/>
-          <p:nvPr/>
-        </p:nvSpPr>
-        <p:spPr>
-          <a:xfrm>
-            <a:off x="417830" y="3651885"/>
-            <a:ext cx="935990" cy="575945"/>
-          </a:xfrm>
-          <a:prstGeom prst="rect">
-            <a:avLst/>
-          </a:prstGeom>
-          <a:solidFill>
-            <a:schemeClr val="accent5"/>
-          </a:solidFill>
-          <a:ln>
-            <a:noFill/>
-          </a:ln>
-        </p:spPr>
-        <p:style>
-          <a:lnRef idx="2">
-            <a:schemeClr val="accent1">
-              <a:shade val="50000"/>
-            </a:schemeClr>
-          </a:lnRef>
-          <a:fillRef idx="1">
-            <a:schemeClr val="accent1"/>
-          </a:fillRef>
-          <a:effectRef idx="0">
-            <a:schemeClr val="accent1"/>
-          </a:effectRef>
-          <a:fontRef idx="minor">
-            <a:schemeClr val="lt1"/>
-          </a:fontRef>
-        </p:style>
-        <p:txBody>
-          <a:bodyPr rtlCol="0" anchor="ctr"/>
-          <a:p>
-            <a:pPr algn="ctr" defTabSz="914400"/>
-            <a:r>
-              <a:rPr kumimoji="0" lang="en-US" altLang="zh-CN" sz="1200" b="0" i="0" u="none" strike="noStrike" kern="0" cap="none" spc="0" normalizeH="0" baseline="0" noProof="0" dirty="0">
-                <a:ln>
-                  <a:noFill/>
-                </a:ln>
-                <a:solidFill>
-                  <a:sysClr val="windowText" lastClr="000000"/>
-                </a:solidFill>
-                <a:effectLst/>
-                <a:uLnTx/>
-                <a:uFillTx/>
-                <a:latin typeface="仿宋" panose="02010609060101010101" charset="-122"/>
-                <a:ea typeface="仿宋" panose="02010609060101010101" charset="-122"/>
-                <a:cs typeface="+mn-ea"/>
-                <a:sym typeface="+mn-lt"/>
-              </a:rPr>
-              <a:t>mysql</a:t>
-            </a:r>
-            <a:r>
-              <a:rPr kumimoji="0" lang="zh-CN" altLang="en-US" sz="1200" b="0" i="0" u="none" strike="noStrike" kern="0" cap="none" spc="0" normalizeH="0" baseline="0" noProof="0" dirty="0">
-                <a:ln>
-                  <a:noFill/>
-                </a:ln>
-                <a:solidFill>
-                  <a:sysClr val="windowText" lastClr="000000"/>
-                </a:solidFill>
-                <a:effectLst/>
-                <a:uLnTx/>
-                <a:uFillTx/>
-                <a:latin typeface="仿宋" panose="02010609060101010101" charset="-122"/>
-                <a:ea typeface="仿宋" panose="02010609060101010101" charset="-122"/>
-                <a:cs typeface="+mn-ea"/>
-                <a:sym typeface="+mn-lt"/>
-              </a:rPr>
-              <a:t>集群，分表</a:t>
-            </a:r>
-            <a:endParaRPr kumimoji="0" lang="zh-CN" altLang="en-US" sz="1200" b="0" i="0" u="none" strike="noStrike" kern="0" cap="none" spc="0" normalizeH="0" baseline="0" noProof="0" dirty="0">
-              <a:ln>
-                <a:noFill/>
-              </a:ln>
-              <a:solidFill>
-                <a:sysClr val="windowText" lastClr="000000"/>
-              </a:solidFill>
-              <a:effectLst/>
-              <a:uLnTx/>
-              <a:uFillTx/>
-              <a:latin typeface="仿宋" panose="02010609060101010101" charset="-122"/>
-              <a:ea typeface="仿宋" panose="02010609060101010101" charset="-122"/>
-              <a:cs typeface="+mn-ea"/>
-              <a:sym typeface="+mn-lt"/>
-            </a:endParaRPr>
-          </a:p>
-        </p:txBody>
-      </p:sp>
-      <p:cxnSp>
-        <p:nvCxnSpPr>
-          <p:cNvPr id="11" name="直接箭头连接符 10"/>
-          <p:cNvCxnSpPr/>
-          <p:nvPr/>
-        </p:nvCxnSpPr>
-        <p:spPr>
-          <a:xfrm flipH="1">
-            <a:off x="826770" y="3075305"/>
-            <a:ext cx="18415" cy="575945"/>
-          </a:xfrm>
-          <a:prstGeom prst="straightConnector1">
-            <a:avLst/>
-          </a:prstGeom>
-          <a:ln>
-            <a:tailEnd type="arrow"/>
-          </a:ln>
-        </p:spPr>
-        <p:style>
-          <a:lnRef idx="1">
-            <a:schemeClr val="accent1"/>
-          </a:lnRef>
-          <a:fillRef idx="0">
-            <a:schemeClr val="accent1"/>
-          </a:fillRef>
-          <a:effectRef idx="0">
-            <a:schemeClr val="accent1"/>
-          </a:effectRef>
-          <a:fontRef idx="minor">
-            <a:schemeClr val="tx1"/>
-          </a:fontRef>
-        </p:style>
-      </p:cxnSp>
-      <p:cxnSp>
-        <p:nvCxnSpPr>
-          <p:cNvPr id="12" name="直接箭头连接符 11"/>
-          <p:cNvCxnSpPr/>
-          <p:nvPr/>
-        </p:nvCxnSpPr>
-        <p:spPr>
-          <a:xfrm flipH="1">
-            <a:off x="3262630" y="1993265"/>
-            <a:ext cx="18415" cy="575945"/>
-          </a:xfrm>
-          <a:prstGeom prst="straightConnector1">
-            <a:avLst/>
-          </a:prstGeom>
-          <a:ln>
-            <a:tailEnd type="arrow"/>
-          </a:ln>
-        </p:spPr>
-        <p:style>
-          <a:lnRef idx="1">
-            <a:schemeClr val="accent1"/>
-          </a:lnRef>
-          <a:fillRef idx="0">
-            <a:schemeClr val="accent1"/>
-          </a:fillRef>
-          <a:effectRef idx="0">
-            <a:schemeClr val="accent1"/>
-          </a:effectRef>
-          <a:fontRef idx="minor">
-            <a:schemeClr val="tx1"/>
-          </a:fontRef>
-        </p:style>
-      </p:cxnSp>
     </p:spTree>
   </p:cSld>
   <p:clrMapOvr>

</xml_diff>